<commit_message>
Updated presentation ppt and pdf in /presentation
</commit_message>
<xml_diff>
--- a/presentation/ParkingLotApp.pptx
+++ b/presentation/ParkingLotApp.pptx
@@ -10,16 +10,13 @@
     <p:sldId id="258" r:id="rId4"/>
     <p:sldId id="259" r:id="rId5"/>
     <p:sldId id="268" r:id="rId6"/>
-    <p:sldId id="269" r:id="rId7"/>
-    <p:sldId id="262" r:id="rId8"/>
-    <p:sldId id="260" r:id="rId9"/>
-    <p:sldId id="261" r:id="rId10"/>
-    <p:sldId id="263" r:id="rId11"/>
-    <p:sldId id="265" r:id="rId12"/>
-    <p:sldId id="270" r:id="rId13"/>
-    <p:sldId id="264" r:id="rId14"/>
-    <p:sldId id="267" r:id="rId15"/>
-    <p:sldId id="266" r:id="rId16"/>
+    <p:sldId id="260" r:id="rId7"/>
+    <p:sldId id="263" r:id="rId8"/>
+    <p:sldId id="265" r:id="rId9"/>
+    <p:sldId id="270" r:id="rId10"/>
+    <p:sldId id="264" r:id="rId11"/>
+    <p:sldId id="267" r:id="rId12"/>
+    <p:sldId id="266" r:id="rId13"/>
   </p:sldIdLst>
   <p:sldSz cx="9144000" cy="6858000" type="screen4x3"/>
   <p:notesSz cx="6858000" cy="9144000"/>
@@ -754,7 +751,7 @@
           </a:ln>
           <a:extLst>
             <a:ext uri="{91240B29-F687-4f45-9708-019B960494DF}">
-              <a14:hiddenLine xmlns:a14="http://schemas.microsoft.com/office/drawing/2010/main" xmlns="" w="9525">
+              <a14:hiddenLine xmlns="" xmlns:a14="http://schemas.microsoft.com/office/drawing/2010/main" w="9525">
                 <a:solidFill>
                   <a:srgbClr val="000000"/>
                 </a:solidFill>
@@ -809,7 +806,7 @@
           </a:ln>
           <a:extLst>
             <a:ext uri="{91240B29-F687-4f45-9708-019B960494DF}">
-              <a14:hiddenLine xmlns:a14="http://schemas.microsoft.com/office/drawing/2010/main" xmlns="" w="9525">
+              <a14:hiddenLine xmlns="" xmlns:a14="http://schemas.microsoft.com/office/drawing/2010/main" w="9525">
                 <a:solidFill>
                   <a:srgbClr val="000000"/>
                 </a:solidFill>
@@ -6396,7 +6393,7 @@
           <a:lstStyle/>
           <a:p>
             <a:r>
-              <a:t>Unit Testing Summary</a:t>
+              <a:t>Challenges &amp; Trade-offs</a:t>
             </a:r>
           </a:p>
         </p:txBody>
@@ -6417,52 +6414,38 @@
           <a:lstStyle/>
           <a:p>
             <a:r>
-              <a:rPr lang="en-US" dirty="0"/>
-              <a:t>10</a:t>
-            </a:r>
-            <a:r>
               <a:rPr dirty="0"/>
-              <a:t> total unit tests</a:t>
-            </a:r>
-          </a:p>
-          <a:p>
+              <a:t>Serialization scrapped</a:t>
+            </a:r>
+            <a:r>
+              <a:rPr lang="en-US" dirty="0"/>
+              <a:t> </a:t>
+            </a:r>
             <a:r>
               <a:rPr dirty="0"/>
-              <a:t>Tested </a:t>
-            </a:r>
-            <a:r>
-              <a:rPr lang="en-US" dirty="0"/>
-              <a:t>initialization, </a:t>
-            </a:r>
+              <a:t>to </a:t>
+            </a:r>
+            <a:r>
+              <a:rPr lang="en-US" dirty="0"/>
+              <a:t>maintain simplicity; suitable for future scope of the project</a:t>
+            </a:r>
+            <a:endParaRPr dirty="0"/>
+          </a:p>
+          <a:p>
             <a:r>
               <a:rPr dirty="0"/>
-              <a:t>parking, removal, overflow, duplication</a:t>
-            </a:r>
+              <a:t>Slot ID mapping removed </a:t>
+            </a:r>
+            <a:r>
+              <a:rPr lang="en-US" dirty="0"/>
+              <a:t>due to not being in current project scope; better for future scope of the project</a:t>
+            </a:r>
+            <a:endParaRPr dirty="0"/>
           </a:p>
           <a:p>
             <a:r>
               <a:rPr dirty="0"/>
-              <a:t>Verified slot count and internal map integrity</a:t>
-            </a:r>
-          </a:p>
-          <a:p>
-            <a:r>
-              <a:rPr dirty="0"/>
-              <a:t>Handled custom exceptions for failures</a:t>
-            </a:r>
-          </a:p>
-          <a:p>
-            <a:r>
-              <a:rPr dirty="0"/>
-              <a:t>Visual test</a:t>
-            </a:r>
-            <a:r>
-              <a:rPr lang="en-US" dirty="0"/>
-              <a:t>ing </a:t>
-            </a:r>
-            <a:r>
-              <a:rPr dirty="0"/>
-              <a:t>for display status</a:t>
+              <a:t>Focus kept on simplicity, maintainability, and clarity</a:t>
             </a:r>
           </a:p>
         </p:txBody>
@@ -6494,484 +6477,6 @@
       </p:grpSpPr>
       <p:sp>
         <p:nvSpPr>
-          <p:cNvPr id="2" name="Title 1"/>
-          <p:cNvSpPr>
-            <a:spLocks noGrp="1"/>
-          </p:cNvSpPr>
-          <p:nvPr>
-            <p:ph type="title"/>
-          </p:nvPr>
-        </p:nvSpPr>
-        <p:spPr/>
-        <p:txBody>
-          <a:bodyPr/>
-          <a:lstStyle/>
-          <a:p>
-            <a:r>
-              <a:rPr dirty="0"/>
-              <a:t>How to Run the </a:t>
-            </a:r>
-            <a:r>
-              <a:rPr lang="en-US" dirty="0"/>
-              <a:t>JAR File</a:t>
-            </a:r>
-            <a:endParaRPr dirty="0"/>
-          </a:p>
-        </p:txBody>
-      </p:sp>
-      <p:sp>
-        <p:nvSpPr>
-          <p:cNvPr id="3" name="Content Placeholder 2"/>
-          <p:cNvSpPr>
-            <a:spLocks noGrp="1"/>
-          </p:cNvSpPr>
-          <p:nvPr>
-            <p:ph idx="1"/>
-          </p:nvPr>
-        </p:nvSpPr>
-        <p:spPr/>
-        <p:txBody>
-          <a:bodyPr>
-            <a:normAutofit fontScale="92500" lnSpcReduction="20000"/>
-          </a:bodyPr>
-          <a:lstStyle/>
-          <a:p>
-            <a:r>
-              <a:rPr dirty="0"/>
-              <a:t>Ensure Java 17+ is installed</a:t>
-            </a:r>
-            <a:endParaRPr lang="en-US" dirty="0"/>
-          </a:p>
-          <a:p>
-            <a:r>
-              <a:rPr lang="en-US" dirty="0"/>
-              <a:t>Find the JAR file in:</a:t>
-            </a:r>
-          </a:p>
-          <a:p>
-            <a:pPr marL="0" indent="0">
-              <a:buNone/>
-            </a:pPr>
-            <a:r>
-              <a:rPr lang="en-US" dirty="0"/>
-              <a:t>	</a:t>
-            </a:r>
-            <a:r>
-              <a:rPr lang="en-US" dirty="0" err="1"/>
-              <a:t>ParkingLotApp</a:t>
-            </a:r>
-            <a:r>
-              <a:rPr lang="en-US" dirty="0"/>
-              <a:t>/release/</a:t>
-            </a:r>
-          </a:p>
-          <a:p>
-            <a:r>
-              <a:rPr lang="en-US" dirty="0"/>
-              <a:t>Open Terminal or Command Prompt</a:t>
-            </a:r>
-          </a:p>
-          <a:p>
-            <a:r>
-              <a:rPr lang="en-US" dirty="0"/>
-              <a:t>Navigate to directory containing JAR file</a:t>
-            </a:r>
-            <a:endParaRPr dirty="0"/>
-          </a:p>
-          <a:p>
-            <a:r>
-              <a:rPr dirty="0"/>
-              <a:t>Run using command:</a:t>
-            </a:r>
-          </a:p>
-          <a:p>
-            <a:pPr marL="0" indent="0">
-              <a:buNone/>
-            </a:pPr>
-            <a:r>
-              <a:rPr lang="en-US" dirty="0"/>
-              <a:t>	</a:t>
-            </a:r>
-            <a:r>
-              <a:rPr dirty="0"/>
-              <a:t>java -jar ParkingLotApp-1.0-SNAPSHOT.jar</a:t>
-            </a:r>
-          </a:p>
-          <a:p>
-            <a:r>
-              <a:rPr dirty="0"/>
-              <a:t>(No setup or IDE required)</a:t>
-            </a:r>
-          </a:p>
-        </p:txBody>
-      </p:sp>
-    </p:spTree>
-  </p:cSld>
-  <p:clrMapOvr>
-    <a:masterClrMapping/>
-  </p:clrMapOvr>
-</p:sld>
-</file>
-
-<file path=ppt/slides/slide12.xml><?xml version="1.0" encoding="utf-8"?>
-<p:sld xmlns:a="http://schemas.openxmlformats.org/drawingml/2006/main" xmlns:r="http://schemas.openxmlformats.org/officeDocument/2006/relationships" xmlns:p="http://schemas.openxmlformats.org/presentationml/2006/main">
-  <p:cSld>
-    <p:spTree>
-      <p:nvGrpSpPr>
-        <p:cNvPr id="1" name=""/>
-        <p:cNvGrpSpPr/>
-        <p:nvPr/>
-      </p:nvGrpSpPr>
-      <p:grpSpPr>
-        <a:xfrm>
-          <a:off x="0" y="0"/>
-          <a:ext cx="0" cy="0"/>
-          <a:chOff x="0" y="0"/>
-          <a:chExt cx="0" cy="0"/>
-        </a:xfrm>
-      </p:grpSpPr>
-      <p:sp>
-        <p:nvSpPr>
-          <p:cNvPr id="2" name="Title 1">
-            <a:extLst>
-              <a:ext uri="{FF2B5EF4-FFF2-40B4-BE49-F238E27FC236}">
-                <a16:creationId xmlns:a16="http://schemas.microsoft.com/office/drawing/2014/main" id="{98FBBB9A-A34E-5E11-0250-179C927A2F6F}"/>
-              </a:ext>
-            </a:extLst>
-          </p:cNvPr>
-          <p:cNvSpPr>
-            <a:spLocks noGrp="1"/>
-          </p:cNvSpPr>
-          <p:nvPr>
-            <p:ph type="title"/>
-          </p:nvPr>
-        </p:nvSpPr>
-        <p:spPr/>
-        <p:txBody>
-          <a:bodyPr/>
-          <a:lstStyle/>
-          <a:p>
-            <a:r>
-              <a:rPr lang="en-US" dirty="0"/>
-              <a:t>Run, Test &amp; Verify the Application</a:t>
-            </a:r>
-          </a:p>
-        </p:txBody>
-      </p:sp>
-      <p:sp>
-        <p:nvSpPr>
-          <p:cNvPr id="3" name="Content Placeholder 2">
-            <a:extLst>
-              <a:ext uri="{FF2B5EF4-FFF2-40B4-BE49-F238E27FC236}">
-                <a16:creationId xmlns:a16="http://schemas.microsoft.com/office/drawing/2014/main" id="{3EBE43FD-FCDF-52E3-6036-C7317E3F0120}"/>
-              </a:ext>
-            </a:extLst>
-          </p:cNvPr>
-          <p:cNvSpPr>
-            <a:spLocks noGrp="1"/>
-          </p:cNvSpPr>
-          <p:nvPr>
-            <p:ph idx="1"/>
-          </p:nvPr>
-        </p:nvSpPr>
-        <p:spPr/>
-        <p:txBody>
-          <a:bodyPr>
-            <a:normAutofit fontScale="70000" lnSpcReduction="20000"/>
-          </a:bodyPr>
-          <a:lstStyle/>
-          <a:p>
-            <a:r>
-              <a:rPr lang="en-US" dirty="0"/>
-              <a:t>Build and run (In terminal) :</a:t>
-            </a:r>
-          </a:p>
-          <a:p>
-            <a:pPr marL="0" indent="0">
-              <a:buNone/>
-            </a:pPr>
-            <a:r>
-              <a:rPr lang="en-US" dirty="0"/>
-              <a:t>	</a:t>
-            </a:r>
-            <a:r>
-              <a:rPr lang="en-US" dirty="0" err="1"/>
-              <a:t>mvn</a:t>
-            </a:r>
-            <a:r>
-              <a:rPr lang="en-US" dirty="0"/>
-              <a:t> clean install</a:t>
-            </a:r>
-          </a:p>
-          <a:p>
-            <a:pPr marL="0" indent="0">
-              <a:buNone/>
-            </a:pPr>
-            <a:r>
-              <a:rPr lang="en-US" dirty="0"/>
-              <a:t>	</a:t>
-            </a:r>
-            <a:r>
-              <a:rPr lang="en-US" dirty="0" err="1"/>
-              <a:t>mvn</a:t>
-            </a:r>
-            <a:r>
-              <a:rPr lang="en-US" dirty="0"/>
-              <a:t> </a:t>
-            </a:r>
-            <a:r>
-              <a:rPr lang="en-US" dirty="0" err="1"/>
-              <a:t>exec:java</a:t>
-            </a:r>
-            <a:r>
-              <a:rPr lang="en-US" dirty="0"/>
-              <a:t> -</a:t>
-            </a:r>
-            <a:r>
-              <a:rPr lang="en-US" dirty="0" err="1"/>
-              <a:t>Dexec.mainClass</a:t>
-            </a:r>
-            <a:r>
-              <a:rPr lang="en-US" dirty="0"/>
-              <a:t>="</a:t>
-            </a:r>
-            <a:r>
-              <a:rPr lang="en-US" dirty="0" err="1"/>
-              <a:t>com.parkinglot.Main</a:t>
-            </a:r>
-            <a:r>
-              <a:rPr lang="en-US" dirty="0"/>
-              <a:t>"</a:t>
-            </a:r>
-          </a:p>
-          <a:p>
-            <a:r>
-              <a:rPr lang="en-US" dirty="0"/>
-              <a:t>Alternatively, if `</a:t>
-            </a:r>
-            <a:r>
-              <a:rPr lang="en-US" dirty="0" err="1"/>
-              <a:t>mainClass</a:t>
-            </a:r>
-            <a:r>
-              <a:rPr lang="en-US" dirty="0"/>
-              <a:t>` is configured in `pom.xml` for `exec-maven-plugin`:</a:t>
-            </a:r>
-          </a:p>
-          <a:p>
-            <a:pPr marL="0" indent="0">
-              <a:buNone/>
-            </a:pPr>
-            <a:r>
-              <a:rPr lang="en-US" dirty="0"/>
-              <a:t>	</a:t>
-            </a:r>
-            <a:r>
-              <a:rPr lang="en-US" dirty="0" err="1"/>
-              <a:t>mvn</a:t>
-            </a:r>
-            <a:r>
-              <a:rPr lang="en-US" dirty="0"/>
-              <a:t> clean install</a:t>
-            </a:r>
-          </a:p>
-          <a:p>
-            <a:pPr marL="0" indent="0">
-              <a:buNone/>
-            </a:pPr>
-            <a:r>
-              <a:rPr lang="en-US" dirty="0"/>
-              <a:t>	</a:t>
-            </a:r>
-            <a:r>
-              <a:rPr lang="en-US" dirty="0" err="1"/>
-              <a:t>mvn</a:t>
-            </a:r>
-            <a:r>
-              <a:rPr lang="en-US" dirty="0"/>
-              <a:t> </a:t>
-            </a:r>
-            <a:r>
-              <a:rPr lang="en-US" dirty="0" err="1"/>
-              <a:t>exec:java</a:t>
-            </a:r>
-            <a:endParaRPr lang="en-US" dirty="0"/>
-          </a:p>
-          <a:p>
-            <a:r>
-              <a:rPr lang="en-US" dirty="0"/>
-              <a:t>Ensure `exec-maven-plugin` is configured in `pom.xml`.</a:t>
-            </a:r>
-          </a:p>
-          <a:p>
-            <a:r>
-              <a:rPr lang="en-US" dirty="0"/>
-              <a:t>Run all unit tests:</a:t>
-            </a:r>
-          </a:p>
-          <a:p>
-            <a:pPr marL="0" indent="0">
-              <a:buNone/>
-            </a:pPr>
-            <a:r>
-              <a:rPr lang="en-US" dirty="0"/>
-              <a:t>	</a:t>
-            </a:r>
-            <a:r>
-              <a:rPr lang="en-US" dirty="0" err="1"/>
-              <a:t>mvn</a:t>
-            </a:r>
-            <a:r>
-              <a:rPr lang="en-US" dirty="0"/>
-              <a:t> test</a:t>
-            </a:r>
-          </a:p>
-          <a:p>
-            <a:r>
-              <a:rPr lang="en-US" dirty="0"/>
-              <a:t>Bug-check: </a:t>
-            </a:r>
-            <a:r>
-              <a:rPr lang="en-US" dirty="0" err="1"/>
-              <a:t>SpotBugs</a:t>
-            </a:r>
-            <a:r>
-              <a:rPr lang="en-US" dirty="0"/>
-              <a:t> plugin integrated</a:t>
-            </a:r>
-          </a:p>
-        </p:txBody>
-      </p:sp>
-    </p:spTree>
-    <p:extLst>
-      <p:ext uri="{BB962C8B-B14F-4D97-AF65-F5344CB8AC3E}">
-        <p14:creationId xmlns:p14="http://schemas.microsoft.com/office/powerpoint/2010/main" val="311964766"/>
-      </p:ext>
-    </p:extLst>
-  </p:cSld>
-  <p:clrMapOvr>
-    <a:masterClrMapping/>
-  </p:clrMapOvr>
-</p:sld>
-</file>
-
-<file path=ppt/slides/slide13.xml><?xml version="1.0" encoding="utf-8"?>
-<p:sld xmlns:a="http://schemas.openxmlformats.org/drawingml/2006/main" xmlns:r="http://schemas.openxmlformats.org/officeDocument/2006/relationships" xmlns:p="http://schemas.openxmlformats.org/presentationml/2006/main">
-  <p:cSld>
-    <p:spTree>
-      <p:nvGrpSpPr>
-        <p:cNvPr id="1" name=""/>
-        <p:cNvGrpSpPr/>
-        <p:nvPr/>
-      </p:nvGrpSpPr>
-      <p:grpSpPr>
-        <a:xfrm>
-          <a:off x="0" y="0"/>
-          <a:ext cx="0" cy="0"/>
-          <a:chOff x="0" y="0"/>
-          <a:chExt cx="0" cy="0"/>
-        </a:xfrm>
-      </p:grpSpPr>
-      <p:sp>
-        <p:nvSpPr>
-          <p:cNvPr id="2" name="Title 1"/>
-          <p:cNvSpPr>
-            <a:spLocks noGrp="1"/>
-          </p:cNvSpPr>
-          <p:nvPr>
-            <p:ph type="title"/>
-          </p:nvPr>
-        </p:nvSpPr>
-        <p:spPr/>
-        <p:txBody>
-          <a:bodyPr/>
-          <a:lstStyle/>
-          <a:p>
-            <a:r>
-              <a:t>Challenges &amp; Trade-offs</a:t>
-            </a:r>
-          </a:p>
-        </p:txBody>
-      </p:sp>
-      <p:sp>
-        <p:nvSpPr>
-          <p:cNvPr id="3" name="Content Placeholder 2"/>
-          <p:cNvSpPr>
-            <a:spLocks noGrp="1"/>
-          </p:cNvSpPr>
-          <p:nvPr>
-            <p:ph idx="1"/>
-          </p:nvPr>
-        </p:nvSpPr>
-        <p:spPr/>
-        <p:txBody>
-          <a:bodyPr/>
-          <a:lstStyle/>
-          <a:p>
-            <a:r>
-              <a:rPr dirty="0"/>
-              <a:t>Serialization scrapped</a:t>
-            </a:r>
-            <a:r>
-              <a:rPr lang="en-US" dirty="0"/>
-              <a:t> </a:t>
-            </a:r>
-            <a:r>
-              <a:rPr dirty="0"/>
-              <a:t>to </a:t>
-            </a:r>
-            <a:r>
-              <a:rPr lang="en-US" dirty="0"/>
-              <a:t>maintain simplicity; suitable for future scope of the project</a:t>
-            </a:r>
-            <a:endParaRPr dirty="0"/>
-          </a:p>
-          <a:p>
-            <a:r>
-              <a:rPr dirty="0"/>
-              <a:t>Slot ID mapping removed </a:t>
-            </a:r>
-            <a:r>
-              <a:rPr lang="en-US" dirty="0"/>
-              <a:t>due to not being in current project scope; better for future scope of the project</a:t>
-            </a:r>
-            <a:endParaRPr dirty="0"/>
-          </a:p>
-          <a:p>
-            <a:r>
-              <a:rPr dirty="0"/>
-              <a:t>Focus kept on simplicity, maintainability, and clarity</a:t>
-            </a:r>
-          </a:p>
-        </p:txBody>
-      </p:sp>
-    </p:spTree>
-  </p:cSld>
-  <p:clrMapOvr>
-    <a:masterClrMapping/>
-  </p:clrMapOvr>
-</p:sld>
-</file>
-
-<file path=ppt/slides/slide14.xml><?xml version="1.0" encoding="utf-8"?>
-<p:sld xmlns:a="http://schemas.openxmlformats.org/drawingml/2006/main" xmlns:r="http://schemas.openxmlformats.org/officeDocument/2006/relationships" xmlns:p="http://schemas.openxmlformats.org/presentationml/2006/main">
-  <p:cSld>
-    <p:spTree>
-      <p:nvGrpSpPr>
-        <p:cNvPr id="1" name=""/>
-        <p:cNvGrpSpPr/>
-        <p:nvPr/>
-      </p:nvGrpSpPr>
-      <p:grpSpPr>
-        <a:xfrm>
-          <a:off x="0" y="0"/>
-          <a:ext cx="0" cy="0"/>
-          <a:chOff x="0" y="0"/>
-          <a:chExt cx="0" cy="0"/>
-        </a:xfrm>
-      </p:grpSpPr>
-      <p:sp>
-        <p:nvSpPr>
           <p:cNvPr id="2" name="Title 1">
             <a:extLst>
               <a:ext uri="{FF2B5EF4-FFF2-40B4-BE49-F238E27FC236}">
@@ -7065,7 +6570,7 @@
 </p:sld>
 </file>
 
-<file path=ppt/slides/slide15.xml><?xml version="1.0" encoding="utf-8"?>
+<file path=ppt/slides/slide12.xml><?xml version="1.0" encoding="utf-8"?>
 <p:sld xmlns:a="http://schemas.openxmlformats.org/drawingml/2006/main" xmlns:r="http://schemas.openxmlformats.org/officeDocument/2006/relationships" xmlns:p="http://schemas.openxmlformats.org/presentationml/2006/main">
   <p:cSld>
     <p:spTree>
@@ -7575,34 +7080,33 @@
             <p:ph idx="1"/>
           </p:nvPr>
         </p:nvSpPr>
-        <p:spPr/>
+        <p:spPr>
+          <a:xfrm>
+            <a:off x="982133" y="2177591"/>
+            <a:ext cx="7704667" cy="4091233"/>
+          </a:xfrm>
+        </p:spPr>
         <p:txBody>
           <a:bodyPr>
-            <a:normAutofit fontScale="92500"/>
+            <a:normAutofit fontScale="92500" lnSpcReduction="20000"/>
           </a:bodyPr>
           <a:lstStyle/>
           <a:p>
             <a:r>
               <a:rPr lang="en-US" dirty="0"/>
-              <a:t>User chooses total slot count at startup</a:t>
-            </a:r>
-          </a:p>
-          <a:p>
-            <a:r>
-              <a:rPr lang="en-US" dirty="0"/>
-              <a:t>Parking lot is divided 3-way into SMALL, LARGE, OVERSIZE (Extra slots go to OVERSIZE due to highest fallback)</a:t>
-            </a:r>
-          </a:p>
-          <a:p>
-            <a:r>
-              <a:rPr lang="en-US" dirty="0"/>
-              <a:t>User can choose to: Park, Remove, Show Status, or Exit</a:t>
-            </a:r>
-          </a:p>
-          <a:p>
-            <a:r>
-              <a:rPr lang="en-US" dirty="0"/>
-              <a:t>Park flow: vehicle number and vehicle size input </a:t>
+              <a:t>User sets total slots at start</a:t>
+            </a:r>
+          </a:p>
+          <a:p>
+            <a:r>
+              <a:rPr lang="en-US" dirty="0"/>
+              <a:t>Split into SMALL, LARGE, OVERSIZE (extras → OVERSIZE)</a:t>
+            </a:r>
+          </a:p>
+          <a:p>
+            <a:r>
+              <a:rPr lang="en-US" dirty="0"/>
+              <a:t>Park: Vehicle # + Size (1–3) </a:t>
             </a:r>
             <a:r>
               <a:rPr lang="en-US" dirty="0">
@@ -7612,17 +7116,78 @@
             </a:r>
             <a:r>
               <a:rPr lang="en-US" dirty="0"/>
-              <a:t> tries to find a valid slot</a:t>
-            </a:r>
-          </a:p>
-          <a:p>
-            <a:r>
-              <a:rPr lang="en-US" dirty="0"/>
-              <a:t>Remove flow: uses vehicle number to free up slot</a:t>
-            </a:r>
-          </a:p>
-          <a:p>
-            <a:endParaRPr lang="en-US" dirty="0"/>
+              <a:t> exact slot or larger fallback</a:t>
+            </a:r>
+          </a:p>
+          <a:p>
+            <a:r>
+              <a:rPr lang="en-US" dirty="0"/>
+              <a:t>Remove: Free slot via vehicle #</a:t>
+            </a:r>
+          </a:p>
+          <a:p>
+            <a:r>
+              <a:rPr lang="en-US" dirty="0"/>
+              <a:t>Show Status, Exit</a:t>
+            </a:r>
+          </a:p>
+          <a:p>
+            <a:r>
+              <a:rPr lang="en-US" dirty="0"/>
+              <a:t>Reject empty vehicle numbers</a:t>
+            </a:r>
+          </a:p>
+          <a:p>
+            <a:r>
+              <a:rPr lang="en-US" dirty="0"/>
+              <a:t>Clear success/failure messages</a:t>
+            </a:r>
+          </a:p>
+          <a:p>
+            <a:r>
+              <a:rPr lang="en-US" dirty="0"/>
+              <a:t>Logs go to file (</a:t>
+            </a:r>
+            <a:r>
+              <a:rPr lang="en-US" dirty="0" err="1"/>
+              <a:t>Logback</a:t>
+            </a:r>
+            <a:r>
+              <a:rPr lang="en-US" dirty="0"/>
+              <a:t>)</a:t>
+            </a:r>
+          </a:p>
+          <a:p>
+            <a:r>
+              <a:rPr lang="en-US" dirty="0"/>
+              <a:t>HashMap&lt;String, </a:t>
+            </a:r>
+            <a:r>
+              <a:rPr lang="en-US" dirty="0" err="1"/>
+              <a:t>SlotType</a:t>
+            </a:r>
+            <a:r>
+              <a:rPr lang="en-US" dirty="0"/>
+              <a:t>&gt; – fast removal</a:t>
+            </a:r>
+          </a:p>
+          <a:p>
+            <a:r>
+              <a:rPr lang="en-US" dirty="0" err="1"/>
+              <a:t>EnumMap</a:t>
+            </a:r>
+            <a:r>
+              <a:rPr lang="en-US" dirty="0"/>
+              <a:t>&lt;</a:t>
+            </a:r>
+            <a:r>
+              <a:rPr lang="en-US" dirty="0" err="1"/>
+              <a:t>SlotType</a:t>
+            </a:r>
+            <a:r>
+              <a:rPr lang="en-US" dirty="0"/>
+              <a:t>, Integer&gt; – slot tracking</a:t>
+            </a:r>
           </a:p>
         </p:txBody>
       </p:sp>
@@ -7658,13 +7223,7 @@
       </p:grpSpPr>
       <p:sp>
         <p:nvSpPr>
-          <p:cNvPr id="2" name="Title 1">
-            <a:extLst>
-              <a:ext uri="{FF2B5EF4-FFF2-40B4-BE49-F238E27FC236}">
-                <a16:creationId xmlns:a16="http://schemas.microsoft.com/office/drawing/2014/main" id="{96F6254C-4271-88D3-C5D3-592DE68D53FD}"/>
-              </a:ext>
-            </a:extLst>
-          </p:cNvPr>
+          <p:cNvPr id="2" name="Title 1"/>
           <p:cNvSpPr>
             <a:spLocks noGrp="1"/>
           </p:cNvSpPr>
@@ -7678,21 +7237,15 @@
           <a:lstStyle/>
           <a:p>
             <a:r>
-              <a:rPr lang="en-US" dirty="0"/>
-              <a:t>Demo &amp; Working</a:t>
-            </a:r>
-          </a:p>
-        </p:txBody>
-      </p:sp>
-      <p:sp>
-        <p:nvSpPr>
-          <p:cNvPr id="3" name="Content Placeholder 2">
-            <a:extLst>
-              <a:ext uri="{FF2B5EF4-FFF2-40B4-BE49-F238E27FC236}">
-                <a16:creationId xmlns:a16="http://schemas.microsoft.com/office/drawing/2014/main" id="{B1CCCCDD-0BC7-988F-E766-665A29463F55}"/>
-              </a:ext>
-            </a:extLst>
-          </p:cNvPr>
+              <a:rPr dirty="0"/>
+              <a:t>Key Features</a:t>
+            </a:r>
+          </a:p>
+        </p:txBody>
+      </p:sp>
+      <p:sp>
+        <p:nvSpPr>
+          <p:cNvPr id="3" name="Content Placeholder 2"/>
           <p:cNvSpPr>
             <a:spLocks noGrp="1"/>
           </p:cNvSpPr>
@@ -7702,54 +7255,109 @@
         </p:nvSpPr>
         <p:spPr/>
         <p:txBody>
-          <a:bodyPr/>
-          <a:lstStyle/>
-          <a:p>
-            <a:r>
-              <a:rPr lang="en-US" dirty="0"/>
-              <a:t>Vehicle number input by user (Any String)</a:t>
-            </a:r>
-          </a:p>
-          <a:p>
-            <a:r>
-              <a:rPr lang="en-US" dirty="0"/>
-              <a:t>Vehicle size input via integer menu (1=Small, 2=Large, 3=Oversize)</a:t>
-            </a:r>
-          </a:p>
-          <a:p>
-            <a:r>
-              <a:rPr lang="en-US" dirty="0"/>
-              <a:t>Null or empty vehicle numbers are rejected</a:t>
-            </a:r>
-          </a:p>
-          <a:p>
-            <a:r>
-              <a:rPr lang="en-US" dirty="0"/>
-              <a:t>Logs are recorded in file (via </a:t>
+          <a:bodyPr>
+            <a:normAutofit fontScale="85000" lnSpcReduction="20000"/>
+          </a:bodyPr>
+          <a:lstStyle/>
+          <a:p>
+            <a:r>
+              <a:rPr lang="en-US" dirty="0"/>
+              <a:t>Categorized Slot Management (SMALL, LARGE, OVERSIZE)</a:t>
+            </a:r>
+          </a:p>
+          <a:p>
+            <a:r>
+              <a:rPr lang="en-US" dirty="0"/>
+              <a:t>Fallback Parking Logic (parks in next larger slot if needed)</a:t>
+            </a:r>
+          </a:p>
+          <a:p>
+            <a:r>
+              <a:rPr lang="en-US" dirty="0"/>
+              <a:t>User-Friendly CLI (choice-based input loop)</a:t>
+            </a:r>
+          </a:p>
+          <a:p>
+            <a:r>
+              <a:rPr lang="en-US" dirty="0"/>
+              <a:t>Custom Exception Handling (</a:t>
             </a:r>
             <a:r>
               <a:rPr lang="en-US" dirty="0" err="1"/>
-              <a:t>logback</a:t>
-            </a:r>
-            <a:r>
-              <a:rPr lang="en-US" dirty="0"/>
-              <a:t>), not console</a:t>
-            </a:r>
-          </a:p>
-          <a:p>
-            <a:r>
-              <a:rPr lang="en-US" dirty="0"/>
-              <a:t>Graceful messages shown on success/failure</a:t>
+              <a:t>NoAvailableSlotException</a:t>
+            </a:r>
+            <a:r>
+              <a:rPr lang="en-US" dirty="0"/>
+              <a:t>, </a:t>
+            </a:r>
+            <a:r>
+              <a:rPr lang="en-US" dirty="0" err="1"/>
+              <a:t>VehicleNotFoundException</a:t>
+            </a:r>
+            <a:r>
+              <a:rPr lang="en-US" dirty="0"/>
+              <a:t>)</a:t>
+            </a:r>
+          </a:p>
+          <a:p>
+            <a:r>
+              <a:rPr lang="en-US" dirty="0"/>
+              <a:t>File-Based Logging with SLF4J + </a:t>
+            </a:r>
+            <a:r>
+              <a:rPr lang="en-US" dirty="0" err="1"/>
+              <a:t>Logback</a:t>
+            </a:r>
+            <a:r>
+              <a:rPr lang="en-US" dirty="0"/>
+              <a:t> (no </a:t>
+            </a:r>
+            <a:r>
+              <a:rPr lang="en-US" dirty="0" err="1"/>
+              <a:t>System.out.println</a:t>
+            </a:r>
+            <a:r>
+              <a:rPr lang="en-US" dirty="0"/>
+              <a:t>)</a:t>
+            </a:r>
+          </a:p>
+          <a:p>
+            <a:r>
+              <a:rPr lang="en-US" dirty="0"/>
+              <a:t>Code Quality Tools: </a:t>
+            </a:r>
+            <a:r>
+              <a:rPr lang="en-US" dirty="0" err="1"/>
+              <a:t>SpotBugs</a:t>
+            </a:r>
+            <a:r>
+              <a:rPr lang="en-US" dirty="0"/>
+              <a:t>, PMD, </a:t>
+            </a:r>
+            <a:r>
+              <a:rPr lang="en-US" dirty="0" err="1"/>
+              <a:t>Checkstyle</a:t>
+            </a:r>
+            <a:r>
+              <a:rPr lang="en-US" dirty="0"/>
+              <a:t> (via Maven)</a:t>
+            </a:r>
+          </a:p>
+          <a:p>
+            <a:r>
+              <a:rPr lang="en-US" dirty="0"/>
+              <a:t>JUnit 5 Unit Tests (covers edge and fallback cases)</a:t>
+            </a:r>
+          </a:p>
+          <a:p>
+            <a:r>
+              <a:rPr lang="en-US" dirty="0"/>
+              <a:t>Modular &amp; Testable Design (SRP-friendly structure)</a:t>
             </a:r>
           </a:p>
         </p:txBody>
       </p:sp>
     </p:spTree>
-    <p:extLst>
-      <p:ext uri="{BB962C8B-B14F-4D97-AF65-F5344CB8AC3E}">
-        <p14:creationId xmlns:p14="http://schemas.microsoft.com/office/powerpoint/2010/main" val="930982920"/>
-      </p:ext>
-    </p:extLst>
   </p:cSld>
   <p:clrMapOvr>
     <a:masterClrMapping/>
@@ -7790,7 +7398,7 @@
           <a:lstStyle/>
           <a:p>
             <a:r>
-              <a:t>Slot Allocation Strategy</a:t>
+              <a:t>Unit Testing Summary</a:t>
             </a:r>
           </a:p>
         </p:txBody>
@@ -7811,52 +7419,52 @@
           <a:lstStyle/>
           <a:p>
             <a:r>
+              <a:rPr lang="en-US" dirty="0"/>
+              <a:t>10</a:t>
+            </a:r>
+            <a:r>
               <a:rPr dirty="0"/>
-              <a:t>Exact size preferred</a:t>
+              <a:t> total unit tests</a:t>
             </a:r>
           </a:p>
           <a:p>
             <a:r>
               <a:rPr dirty="0"/>
-              <a:t>Fallback to larger size if exact slot unavailable</a:t>
-            </a:r>
-          </a:p>
-          <a:p>
+              <a:t>Tested </a:t>
+            </a:r>
+            <a:r>
+              <a:rPr lang="en-US" dirty="0"/>
+              <a:t>initialization, </a:t>
+            </a:r>
             <a:r>
               <a:rPr dirty="0"/>
-              <a:t>Never fallback to smaller size</a:t>
+              <a:t>parking, removal, overflow, duplication</a:t>
             </a:r>
           </a:p>
           <a:p>
             <a:r>
               <a:rPr dirty="0"/>
-              <a:t>HashMap&lt;String, </a:t>
-            </a:r>
-            <a:r>
-              <a:rPr dirty="0" err="1"/>
-              <a:t>SlotType</a:t>
-            </a:r>
+              <a:t>Verified slot count and internal map integrity</a:t>
+            </a:r>
+          </a:p>
+          <a:p>
             <a:r>
               <a:rPr dirty="0"/>
-              <a:t>&gt; used for quick removal</a:t>
-            </a:r>
-          </a:p>
-          <a:p>
-            <a:r>
-              <a:rPr dirty="0" err="1"/>
-              <a:t>EnumMap</a:t>
-            </a:r>
+              <a:t>Handled custom exceptions for failures</a:t>
+            </a:r>
+          </a:p>
+          <a:p>
             <a:r>
               <a:rPr dirty="0"/>
-              <a:t>&lt;</a:t>
-            </a:r>
-            <a:r>
-              <a:rPr dirty="0" err="1"/>
-              <a:t>SlotType</a:t>
+              <a:t>Visual test</a:t>
+            </a:r>
+            <a:r>
+              <a:rPr lang="en-US" dirty="0"/>
+              <a:t>ing </a:t>
             </a:r>
             <a:r>
               <a:rPr dirty="0"/>
-              <a:t>, Integer&gt; used for slot count tracking</a:t>
+              <a:t>for display status</a:t>
             </a:r>
           </a:p>
         </p:txBody>
@@ -7902,8 +7510,14 @@
           <a:lstStyle/>
           <a:p>
             <a:r>
-              <a:t>Key Features</a:t>
-            </a:r>
+              <a:rPr dirty="0"/>
+              <a:t>How to Run the </a:t>
+            </a:r>
+            <a:r>
+              <a:rPr lang="en-US" dirty="0"/>
+              <a:t>JAR File</a:t>
+            </a:r>
+            <a:endParaRPr dirty="0"/>
           </a:p>
         </p:txBody>
       </p:sp>
@@ -7920,52 +7534,75 @@
         <p:spPr/>
         <p:txBody>
           <a:bodyPr>
-            <a:normAutofit lnSpcReduction="10000"/>
+            <a:normAutofit fontScale="92500" lnSpcReduction="20000"/>
           </a:bodyPr>
           <a:lstStyle/>
           <a:p>
             <a:r>
               <a:rPr dirty="0"/>
-              <a:t>Categorized slot management (SMALL, LARGE, OVERSIZE)</a:t>
-            </a:r>
+              <a:t>Ensure Java 17+ is installed</a:t>
+            </a:r>
+            <a:endParaRPr lang="en-US" dirty="0"/>
+          </a:p>
+          <a:p>
+            <a:r>
+              <a:rPr lang="en-US" dirty="0"/>
+              <a:t>Find the JAR file in:</a:t>
+            </a:r>
+          </a:p>
+          <a:p>
+            <a:pPr marL="0" indent="0">
+              <a:buNone/>
+            </a:pPr>
+            <a:r>
+              <a:rPr lang="en-US" dirty="0"/>
+              <a:t>	</a:t>
+            </a:r>
+            <a:r>
+              <a:rPr lang="en-US" dirty="0" err="1"/>
+              <a:t>ParkingLotApp</a:t>
+            </a:r>
+            <a:r>
+              <a:rPr lang="en-US" dirty="0"/>
+              <a:t>/release/</a:t>
+            </a:r>
+          </a:p>
+          <a:p>
+            <a:r>
+              <a:rPr lang="en-US" dirty="0"/>
+              <a:t>Open Terminal or Command Prompt</a:t>
+            </a:r>
+          </a:p>
+          <a:p>
+            <a:r>
+              <a:rPr lang="en-US" dirty="0"/>
+              <a:t>Navigate to directory containing JAR file</a:t>
+            </a:r>
+            <a:endParaRPr dirty="0"/>
           </a:p>
           <a:p>
             <a:r>
               <a:rPr dirty="0"/>
-              <a:t>Fallback parking logic (to larger slot type)</a:t>
-            </a:r>
-          </a:p>
-          <a:p>
-            <a:r>
-              <a:rPr lang="en-US" dirty="0"/>
-              <a:t>Custom Exceptions and g</a:t>
+              <a:t>Run using command:</a:t>
+            </a:r>
+          </a:p>
+          <a:p>
+            <a:pPr marL="0" indent="0">
+              <a:buNone/>
+            </a:pPr>
+            <a:r>
+              <a:rPr lang="en-US" dirty="0"/>
+              <a:t>	</a:t>
             </a:r>
             <a:r>
               <a:rPr dirty="0"/>
-              <a:t>raceful error handling</a:t>
+              <a:t>java -jar ParkingLotApp-1.0-SNAPSHOT.jar</a:t>
             </a:r>
           </a:p>
           <a:p>
             <a:r>
               <a:rPr dirty="0"/>
-              <a:t>User-friendly CLI (choice-based loop)</a:t>
-            </a:r>
-          </a:p>
-          <a:p>
-            <a:r>
-              <a:rPr dirty="0"/>
-              <a:t>File-based logging with SLF4J + </a:t>
-            </a:r>
-            <a:r>
-              <a:rPr dirty="0" err="1"/>
-              <a:t>Logback</a:t>
-            </a:r>
-            <a:endParaRPr dirty="0"/>
-          </a:p>
-          <a:p>
-            <a:r>
-              <a:rPr dirty="0"/>
-              <a:t>Testable modular code</a:t>
+              <a:t>(No setup or IDE required)</a:t>
             </a:r>
           </a:p>
         </p:txBody>
@@ -7997,7 +7634,13 @@
       </p:grpSpPr>
       <p:sp>
         <p:nvSpPr>
-          <p:cNvPr id="2" name="Title 1"/>
+          <p:cNvPr id="2" name="Title 1">
+            <a:extLst>
+              <a:ext uri="{FF2B5EF4-FFF2-40B4-BE49-F238E27FC236}">
+                <a16:creationId xmlns:a16="http://schemas.microsoft.com/office/drawing/2014/main" id="{98FBBB9A-A34E-5E11-0250-179C927A2F6F}"/>
+              </a:ext>
+            </a:extLst>
+          </p:cNvPr>
           <p:cNvSpPr>
             <a:spLocks noGrp="1"/>
           </p:cNvSpPr>
@@ -8011,14 +7654,21 @@
           <a:lstStyle/>
           <a:p>
             <a:r>
-              <a:t>Extra Features Implemented</a:t>
-            </a:r>
-          </a:p>
-        </p:txBody>
-      </p:sp>
-      <p:sp>
-        <p:nvSpPr>
-          <p:cNvPr id="3" name="Content Placeholder 2"/>
+              <a:rPr lang="en-US" dirty="0"/>
+              <a:t>Run, Test &amp; Verify the Application</a:t>
+            </a:r>
+          </a:p>
+        </p:txBody>
+      </p:sp>
+      <p:sp>
+        <p:nvSpPr>
+          <p:cNvPr id="3" name="Content Placeholder 2">
+            <a:extLst>
+              <a:ext uri="{FF2B5EF4-FFF2-40B4-BE49-F238E27FC236}">
+                <a16:creationId xmlns:a16="http://schemas.microsoft.com/office/drawing/2014/main" id="{3EBE43FD-FCDF-52E3-6036-C7317E3F0120}"/>
+              </a:ext>
+            </a:extLst>
+          </p:cNvPr>
           <p:cNvSpPr>
             <a:spLocks noGrp="1"/>
           </p:cNvSpPr>
@@ -8029,69 +7679,177 @@
         <p:spPr/>
         <p:txBody>
           <a:bodyPr>
-            <a:normAutofit/>
+            <a:normAutofit fontScale="70000" lnSpcReduction="20000"/>
           </a:bodyPr>
           <a:lstStyle/>
           <a:p>
             <a:r>
-              <a:rPr dirty="0"/>
-              <a:t>Logging with SLF4J/</a:t>
-            </a:r>
-            <a:r>
-              <a:rPr dirty="0" err="1"/>
-              <a:t>Logback</a:t>
-            </a:r>
-            <a:endParaRPr dirty="0"/>
-          </a:p>
-          <a:p>
-            <a:r>
-              <a:rPr dirty="0"/>
-              <a:t>Code Quality Tools (</a:t>
-            </a:r>
-            <a:r>
-              <a:rPr dirty="0" err="1"/>
+              <a:rPr lang="en-US" dirty="0"/>
+              <a:t>Build and run (In terminal) :</a:t>
+            </a:r>
+          </a:p>
+          <a:p>
+            <a:pPr marL="0" indent="0">
+              <a:buNone/>
+            </a:pPr>
+            <a:r>
+              <a:rPr lang="en-US" dirty="0"/>
+              <a:t>	</a:t>
+            </a:r>
+            <a:r>
+              <a:rPr lang="en-US" dirty="0" err="1"/>
+              <a:t>mvn</a:t>
+            </a:r>
+            <a:r>
+              <a:rPr lang="en-US" dirty="0"/>
+              <a:t> clean install</a:t>
+            </a:r>
+          </a:p>
+          <a:p>
+            <a:pPr marL="0" indent="0">
+              <a:buNone/>
+            </a:pPr>
+            <a:r>
+              <a:rPr lang="en-US" dirty="0"/>
+              <a:t>	</a:t>
+            </a:r>
+            <a:r>
+              <a:rPr lang="en-US" dirty="0" err="1"/>
+              <a:t>mvn</a:t>
+            </a:r>
+            <a:r>
+              <a:rPr lang="en-US" dirty="0"/>
+              <a:t> </a:t>
+            </a:r>
+            <a:r>
+              <a:rPr lang="en-US" dirty="0" err="1"/>
+              <a:t>exec:java</a:t>
+            </a:r>
+            <a:r>
+              <a:rPr lang="en-US" dirty="0"/>
+              <a:t> -</a:t>
+            </a:r>
+            <a:r>
+              <a:rPr lang="en-US" dirty="0" err="1"/>
+              <a:t>Dexec.mainClass</a:t>
+            </a:r>
+            <a:r>
+              <a:rPr lang="en-US" dirty="0"/>
+              <a:t>="</a:t>
+            </a:r>
+            <a:r>
+              <a:rPr lang="en-US" dirty="0" err="1"/>
+              <a:t>com.parkinglot.Main</a:t>
+            </a:r>
+            <a:r>
+              <a:rPr lang="en-US" dirty="0"/>
+              <a:t>"</a:t>
+            </a:r>
+          </a:p>
+          <a:p>
+            <a:r>
+              <a:rPr lang="en-US" dirty="0"/>
+              <a:t>Alternatively, if `</a:t>
+            </a:r>
+            <a:r>
+              <a:rPr lang="en-US" dirty="0" err="1"/>
+              <a:t>mainClass</a:t>
+            </a:r>
+            <a:r>
+              <a:rPr lang="en-US" dirty="0"/>
+              <a:t>` is configured in `pom.xml` for `exec-maven-plugin`:</a:t>
+            </a:r>
+          </a:p>
+          <a:p>
+            <a:pPr marL="0" indent="0">
+              <a:buNone/>
+            </a:pPr>
+            <a:r>
+              <a:rPr lang="en-US" dirty="0"/>
+              <a:t>	</a:t>
+            </a:r>
+            <a:r>
+              <a:rPr lang="en-US" dirty="0" err="1"/>
+              <a:t>mvn</a:t>
+            </a:r>
+            <a:r>
+              <a:rPr lang="en-US" dirty="0"/>
+              <a:t> clean install</a:t>
+            </a:r>
+          </a:p>
+          <a:p>
+            <a:pPr marL="0" indent="0">
+              <a:buNone/>
+            </a:pPr>
+            <a:r>
+              <a:rPr lang="en-US" dirty="0"/>
+              <a:t>	</a:t>
+            </a:r>
+            <a:r>
+              <a:rPr lang="en-US" dirty="0" err="1"/>
+              <a:t>mvn</a:t>
+            </a:r>
+            <a:r>
+              <a:rPr lang="en-US" dirty="0"/>
+              <a:t> </a:t>
+            </a:r>
+            <a:r>
+              <a:rPr lang="en-US" dirty="0" err="1"/>
+              <a:t>exec:java</a:t>
+            </a:r>
+            <a:endParaRPr lang="en-US" dirty="0"/>
+          </a:p>
+          <a:p>
+            <a:r>
+              <a:rPr lang="en-US" dirty="0"/>
+              <a:t>Ensure `exec-maven-plugin` is configured in `pom.xml`.</a:t>
+            </a:r>
+          </a:p>
+          <a:p>
+            <a:r>
+              <a:rPr lang="en-US" dirty="0"/>
+              <a:t>Run all unit tests:</a:t>
+            </a:r>
+          </a:p>
+          <a:p>
+            <a:pPr marL="0" indent="0">
+              <a:buNone/>
+            </a:pPr>
+            <a:r>
+              <a:rPr lang="en-US" dirty="0"/>
+              <a:t>	</a:t>
+            </a:r>
+            <a:r>
+              <a:rPr lang="en-US" dirty="0" err="1"/>
+              <a:t>mvn</a:t>
+            </a:r>
+            <a:r>
+              <a:rPr lang="en-US" dirty="0"/>
+              <a:t> test</a:t>
+            </a:r>
+          </a:p>
+          <a:p>
+            <a:r>
+              <a:rPr lang="en-US" dirty="0"/>
+              <a:t>Bug-check: </a:t>
+            </a:r>
+            <a:r>
+              <a:rPr lang="en-US" dirty="0" err="1"/>
               <a:t>SpotBugs</a:t>
             </a:r>
             <a:r>
-              <a:rPr dirty="0"/>
-              <a:t>, PMD, </a:t>
-            </a:r>
-            <a:r>
-              <a:rPr dirty="0" err="1"/>
-              <a:t>Checkstyle</a:t>
-            </a:r>
-            <a:r>
-              <a:rPr dirty="0"/>
-              <a:t>)</a:t>
-            </a:r>
-          </a:p>
-          <a:p>
-            <a:r>
-              <a:rPr dirty="0"/>
-              <a:t>JUnit 5 Unit Tests</a:t>
-            </a:r>
-          </a:p>
-          <a:p>
-            <a:r>
-              <a:rPr dirty="0"/>
-              <a:t>Custom Exception Handling</a:t>
-            </a:r>
-          </a:p>
-          <a:p>
-            <a:r>
-              <a:rPr dirty="0"/>
-              <a:t>CLI with User Choice Flow</a:t>
-            </a:r>
-          </a:p>
-          <a:p>
-            <a:r>
-              <a:rPr dirty="0"/>
-              <a:t>Slot Allocation Strategy</a:t>
+              <a:rPr lang="en-US" dirty="0"/>
+              <a:t> plugin integrated</a:t>
             </a:r>
           </a:p>
         </p:txBody>
       </p:sp>
     </p:spTree>
+    <p:extLst>
+      <p:ext uri="{BB962C8B-B14F-4D97-AF65-F5344CB8AC3E}">
+        <p14:creationId xmlns:p14="http://schemas.microsoft.com/office/powerpoint/2010/main" val="311964766"/>
+      </p:ext>
+    </p:extLst>
   </p:cSld>
   <p:clrMapOvr>
     <a:masterClrMapping/>

</xml_diff>